<commit_message>
MAJ... Changement de police..
</commit_message>
<xml_diff>
--- a/01_Combinatoire/Cours/images/Comb.pptx
+++ b/01_Combinatoire/Cours/images/Comb.pptx
@@ -303,7 +303,7 @@
             <a:fld id="{26CB6376-A0EE-4D28-A275-A96C17EDB42D}" type="datetimeFigureOut">
               <a:rPr lang="fr-FR" smtClean="0"/>
               <a:pPr/>
-              <a:t>11/02/2014</a:t>
+              <a:t>02/04/2016</a:t>
             </a:fld>
             <a:endParaRPr lang="fr-FR"/>
           </a:p>
@@ -355,7 +355,7 @@
     </p:spTree>
     <p:extLst>
       <p:ext uri="{BB962C8B-B14F-4D97-AF65-F5344CB8AC3E}">
-        <p14:creationId xmlns="" xmlns:p14="http://schemas.microsoft.com/office/powerpoint/2010/main" val="1396154095"/>
+        <p14:creationId xmlns:p14="http://schemas.microsoft.com/office/powerpoint/2010/main" val="1396154095"/>
       </p:ext>
     </p:extLst>
   </p:cSld>
@@ -475,7 +475,7 @@
             <a:fld id="{26CB6376-A0EE-4D28-A275-A96C17EDB42D}" type="datetimeFigureOut">
               <a:rPr lang="fr-FR" smtClean="0"/>
               <a:pPr/>
-              <a:t>11/02/2014</a:t>
+              <a:t>02/04/2016</a:t>
             </a:fld>
             <a:endParaRPr lang="fr-FR"/>
           </a:p>
@@ -527,7 +527,7 @@
     </p:spTree>
     <p:extLst>
       <p:ext uri="{BB962C8B-B14F-4D97-AF65-F5344CB8AC3E}">
-        <p14:creationId xmlns="" xmlns:p14="http://schemas.microsoft.com/office/powerpoint/2010/main" val="3828686294"/>
+        <p14:creationId xmlns:p14="http://schemas.microsoft.com/office/powerpoint/2010/main" val="3828686294"/>
       </p:ext>
     </p:extLst>
   </p:cSld>
@@ -657,7 +657,7 @@
             <a:fld id="{26CB6376-A0EE-4D28-A275-A96C17EDB42D}" type="datetimeFigureOut">
               <a:rPr lang="fr-FR" smtClean="0"/>
               <a:pPr/>
-              <a:t>11/02/2014</a:t>
+              <a:t>02/04/2016</a:t>
             </a:fld>
             <a:endParaRPr lang="fr-FR"/>
           </a:p>
@@ -709,7 +709,7 @@
     </p:spTree>
     <p:extLst>
       <p:ext uri="{BB962C8B-B14F-4D97-AF65-F5344CB8AC3E}">
-        <p14:creationId xmlns="" xmlns:p14="http://schemas.microsoft.com/office/powerpoint/2010/main" val="4092368234"/>
+        <p14:creationId xmlns:p14="http://schemas.microsoft.com/office/powerpoint/2010/main" val="4092368234"/>
       </p:ext>
     </p:extLst>
   </p:cSld>
@@ -829,7 +829,7 @@
             <a:fld id="{26CB6376-A0EE-4D28-A275-A96C17EDB42D}" type="datetimeFigureOut">
               <a:rPr lang="fr-FR" smtClean="0"/>
               <a:pPr/>
-              <a:t>11/02/2014</a:t>
+              <a:t>02/04/2016</a:t>
             </a:fld>
             <a:endParaRPr lang="fr-FR"/>
           </a:p>
@@ -881,7 +881,7 @@
     </p:spTree>
     <p:extLst>
       <p:ext uri="{BB962C8B-B14F-4D97-AF65-F5344CB8AC3E}">
-        <p14:creationId xmlns="" xmlns:p14="http://schemas.microsoft.com/office/powerpoint/2010/main" val="4048033051"/>
+        <p14:creationId xmlns:p14="http://schemas.microsoft.com/office/powerpoint/2010/main" val="4048033051"/>
       </p:ext>
     </p:extLst>
   </p:cSld>
@@ -1077,7 +1077,7 @@
             <a:fld id="{26CB6376-A0EE-4D28-A275-A96C17EDB42D}" type="datetimeFigureOut">
               <a:rPr lang="fr-FR" smtClean="0"/>
               <a:pPr/>
-              <a:t>11/02/2014</a:t>
+              <a:t>02/04/2016</a:t>
             </a:fld>
             <a:endParaRPr lang="fr-FR"/>
           </a:p>
@@ -1129,7 +1129,7 @@
     </p:spTree>
     <p:extLst>
       <p:ext uri="{BB962C8B-B14F-4D97-AF65-F5344CB8AC3E}">
-        <p14:creationId xmlns="" xmlns:p14="http://schemas.microsoft.com/office/powerpoint/2010/main" val="1633597533"/>
+        <p14:creationId xmlns:p14="http://schemas.microsoft.com/office/powerpoint/2010/main" val="1633597533"/>
       </p:ext>
     </p:extLst>
   </p:cSld>
@@ -1367,7 +1367,7 @@
             <a:fld id="{26CB6376-A0EE-4D28-A275-A96C17EDB42D}" type="datetimeFigureOut">
               <a:rPr lang="fr-FR" smtClean="0"/>
               <a:pPr/>
-              <a:t>11/02/2014</a:t>
+              <a:t>02/04/2016</a:t>
             </a:fld>
             <a:endParaRPr lang="fr-FR"/>
           </a:p>
@@ -1419,7 +1419,7 @@
     </p:spTree>
     <p:extLst>
       <p:ext uri="{BB962C8B-B14F-4D97-AF65-F5344CB8AC3E}">
-        <p14:creationId xmlns="" xmlns:p14="http://schemas.microsoft.com/office/powerpoint/2010/main" val="3198401088"/>
+        <p14:creationId xmlns:p14="http://schemas.microsoft.com/office/powerpoint/2010/main" val="3198401088"/>
       </p:ext>
     </p:extLst>
   </p:cSld>
@@ -1791,7 +1791,7 @@
             <a:fld id="{26CB6376-A0EE-4D28-A275-A96C17EDB42D}" type="datetimeFigureOut">
               <a:rPr lang="fr-FR" smtClean="0"/>
               <a:pPr/>
-              <a:t>11/02/2014</a:t>
+              <a:t>02/04/2016</a:t>
             </a:fld>
             <a:endParaRPr lang="fr-FR"/>
           </a:p>
@@ -1843,7 +1843,7 @@
     </p:spTree>
     <p:extLst>
       <p:ext uri="{BB962C8B-B14F-4D97-AF65-F5344CB8AC3E}">
-        <p14:creationId xmlns="" xmlns:p14="http://schemas.microsoft.com/office/powerpoint/2010/main" val="663532041"/>
+        <p14:creationId xmlns:p14="http://schemas.microsoft.com/office/powerpoint/2010/main" val="663532041"/>
       </p:ext>
     </p:extLst>
   </p:cSld>
@@ -1911,7 +1911,7 @@
             <a:fld id="{26CB6376-A0EE-4D28-A275-A96C17EDB42D}" type="datetimeFigureOut">
               <a:rPr lang="fr-FR" smtClean="0"/>
               <a:pPr/>
-              <a:t>11/02/2014</a:t>
+              <a:t>02/04/2016</a:t>
             </a:fld>
             <a:endParaRPr lang="fr-FR"/>
           </a:p>
@@ -1963,7 +1963,7 @@
     </p:spTree>
     <p:extLst>
       <p:ext uri="{BB962C8B-B14F-4D97-AF65-F5344CB8AC3E}">
-        <p14:creationId xmlns="" xmlns:p14="http://schemas.microsoft.com/office/powerpoint/2010/main" val="3033358413"/>
+        <p14:creationId xmlns:p14="http://schemas.microsoft.com/office/powerpoint/2010/main" val="3033358413"/>
       </p:ext>
     </p:extLst>
   </p:cSld>
@@ -2008,7 +2008,7 @@
             <a:fld id="{26CB6376-A0EE-4D28-A275-A96C17EDB42D}" type="datetimeFigureOut">
               <a:rPr lang="fr-FR" smtClean="0"/>
               <a:pPr/>
-              <a:t>11/02/2014</a:t>
+              <a:t>02/04/2016</a:t>
             </a:fld>
             <a:endParaRPr lang="fr-FR"/>
           </a:p>
@@ -2060,7 +2060,7 @@
     </p:spTree>
     <p:extLst>
       <p:ext uri="{BB962C8B-B14F-4D97-AF65-F5344CB8AC3E}">
-        <p14:creationId xmlns="" xmlns:p14="http://schemas.microsoft.com/office/powerpoint/2010/main" val="3353297023"/>
+        <p14:creationId xmlns:p14="http://schemas.microsoft.com/office/powerpoint/2010/main" val="3353297023"/>
       </p:ext>
     </p:extLst>
   </p:cSld>
@@ -2287,7 +2287,7 @@
             <a:fld id="{26CB6376-A0EE-4D28-A275-A96C17EDB42D}" type="datetimeFigureOut">
               <a:rPr lang="fr-FR" smtClean="0"/>
               <a:pPr/>
-              <a:t>11/02/2014</a:t>
+              <a:t>02/04/2016</a:t>
             </a:fld>
             <a:endParaRPr lang="fr-FR"/>
           </a:p>
@@ -2339,7 +2339,7 @@
     </p:spTree>
     <p:extLst>
       <p:ext uri="{BB962C8B-B14F-4D97-AF65-F5344CB8AC3E}">
-        <p14:creationId xmlns="" xmlns:p14="http://schemas.microsoft.com/office/powerpoint/2010/main" val="3424737531"/>
+        <p14:creationId xmlns:p14="http://schemas.microsoft.com/office/powerpoint/2010/main" val="3424737531"/>
       </p:ext>
     </p:extLst>
   </p:cSld>
@@ -2542,7 +2542,7 @@
             <a:fld id="{26CB6376-A0EE-4D28-A275-A96C17EDB42D}" type="datetimeFigureOut">
               <a:rPr lang="fr-FR" smtClean="0"/>
               <a:pPr/>
-              <a:t>11/02/2014</a:t>
+              <a:t>02/04/2016</a:t>
             </a:fld>
             <a:endParaRPr lang="fr-FR"/>
           </a:p>
@@ -2594,7 +2594,7 @@
     </p:spTree>
     <p:extLst>
       <p:ext uri="{BB962C8B-B14F-4D97-AF65-F5344CB8AC3E}">
-        <p14:creationId xmlns="" xmlns:p14="http://schemas.microsoft.com/office/powerpoint/2010/main" val="1333530412"/>
+        <p14:creationId xmlns:p14="http://schemas.microsoft.com/office/powerpoint/2010/main" val="1333530412"/>
       </p:ext>
     </p:extLst>
   </p:cSld>
@@ -2757,7 +2757,7 @@
             <a:fld id="{26CB6376-A0EE-4D28-A275-A96C17EDB42D}" type="datetimeFigureOut">
               <a:rPr lang="fr-FR" smtClean="0"/>
               <a:pPr/>
-              <a:t>11/02/2014</a:t>
+              <a:t>02/04/2016</a:t>
             </a:fld>
             <a:endParaRPr lang="fr-FR"/>
           </a:p>
@@ -2845,7 +2845,7 @@
     </p:spTree>
     <p:extLst>
       <p:ext uri="{BB962C8B-B14F-4D97-AF65-F5344CB8AC3E}">
-        <p14:creationId xmlns="" xmlns:p14="http://schemas.microsoft.com/office/powerpoint/2010/main" val="3451283287"/>
+        <p14:creationId xmlns:p14="http://schemas.microsoft.com/office/powerpoint/2010/main" val="3451283287"/>
       </p:ext>
     </p:extLst>
   </p:cSld>
@@ -3141,7 +3141,7 @@
         </p:nvSpPr>
         <p:spPr>
           <a:xfrm>
-            <a:off x="3491880" y="548680"/>
+            <a:off x="3506957" y="548680"/>
             <a:ext cx="1440160" cy="1368152"/>
           </a:xfrm>
           <a:prstGeom prst="rect">
@@ -3183,7 +3183,7 @@
         </p:nvCxnSpPr>
         <p:spPr>
           <a:xfrm>
-            <a:off x="2411760" y="764704"/>
+            <a:off x="2426837" y="764704"/>
             <a:ext cx="1080120" cy="0"/>
           </a:xfrm>
           <a:prstGeom prst="straightConnector1">
@@ -3216,7 +3216,7 @@
         </p:nvCxnSpPr>
         <p:spPr>
           <a:xfrm>
-            <a:off x="2411760" y="1772816"/>
+            <a:off x="2426837" y="1772816"/>
             <a:ext cx="1080120" cy="0"/>
           </a:xfrm>
           <a:prstGeom prst="straightConnector1">
@@ -3249,7 +3249,7 @@
         </p:nvSpPr>
         <p:spPr>
           <a:xfrm>
-            <a:off x="1331640" y="580038"/>
+            <a:off x="1346717" y="580038"/>
             <a:ext cx="1080120" cy="369332"/>
           </a:xfrm>
           <a:prstGeom prst="rect">
@@ -3287,7 +3287,7 @@
         </p:nvSpPr>
         <p:spPr>
           <a:xfrm>
-            <a:off x="1331640" y="1588150"/>
+            <a:off x="1346717" y="1588150"/>
             <a:ext cx="1080120" cy="369332"/>
           </a:xfrm>
           <a:prstGeom prst="rect">
@@ -3325,7 +3325,7 @@
         </p:nvCxnSpPr>
         <p:spPr>
           <a:xfrm>
-            <a:off x="4932040" y="725385"/>
+            <a:off x="4947117" y="725385"/>
             <a:ext cx="1080120" cy="0"/>
           </a:xfrm>
           <a:prstGeom prst="straightConnector1">
@@ -3361,7 +3361,7 @@
         </p:nvCxnSpPr>
         <p:spPr>
           <a:xfrm>
-            <a:off x="4932040" y="1733497"/>
+            <a:off x="4947117" y="1733497"/>
             <a:ext cx="1080120" cy="0"/>
           </a:xfrm>
           <a:prstGeom prst="straightConnector1">
@@ -3397,7 +3397,7 @@
         </p:nvSpPr>
         <p:spPr>
           <a:xfrm>
-            <a:off x="5997083" y="540719"/>
+            <a:off x="6012160" y="540719"/>
             <a:ext cx="1080120" cy="369332"/>
           </a:xfrm>
           <a:prstGeom prst="rect">
@@ -3430,7 +3430,7 @@
         </p:nvSpPr>
         <p:spPr>
           <a:xfrm>
-            <a:off x="5997083" y="1547500"/>
+            <a:off x="6012160" y="1547500"/>
             <a:ext cx="1080120" cy="369332"/>
           </a:xfrm>
           <a:prstGeom prst="rect">
@@ -3467,7 +3467,7 @@
         </p:nvCxnSpPr>
         <p:spPr>
           <a:xfrm>
-            <a:off x="2951820" y="805354"/>
+            <a:off x="2966897" y="805354"/>
             <a:ext cx="0" cy="967462"/>
           </a:xfrm>
           <a:prstGeom prst="straightConnector1">
@@ -3502,7 +3502,7 @@
         </p:nvCxnSpPr>
         <p:spPr>
           <a:xfrm>
-            <a:off x="5472100" y="766035"/>
+            <a:off x="5487177" y="766035"/>
             <a:ext cx="0" cy="967462"/>
           </a:xfrm>
           <a:prstGeom prst="straightConnector1">
@@ -4035,7 +4035,7 @@
     </p:spTree>
     <p:extLst>
       <p:ext uri="{BB962C8B-B14F-4D97-AF65-F5344CB8AC3E}">
-        <p14:creationId xmlns="" xmlns:p14="http://schemas.microsoft.com/office/powerpoint/2010/main" val="1665989406"/>
+        <p14:creationId xmlns:p14="http://schemas.microsoft.com/office/powerpoint/2010/main" val="1665989406"/>
       </p:ext>
     </p:extLst>
   </p:cSld>
@@ -19690,7 +19690,7 @@
     </p:spTree>
     <p:extLst>
       <p:ext uri="{BB962C8B-B14F-4D97-AF65-F5344CB8AC3E}">
-        <p14:creationId xmlns="" xmlns:p14="http://schemas.microsoft.com/office/powerpoint/2010/main" val="3689370377"/>
+        <p14:creationId xmlns:p14="http://schemas.microsoft.com/office/powerpoint/2010/main" val="3689370377"/>
       </p:ext>
     </p:extLst>
   </p:cSld>
@@ -19729,7 +19729,7 @@
           <a:blip r:embed="rId2" cstate="print">
             <a:extLst>
               <a:ext uri="{28A0092B-C50C-407E-A947-70E740481C1C}">
-                <a14:useLocalDpi xmlns="" xmlns:a14="http://schemas.microsoft.com/office/drawing/2010/main" val="0"/>
+                <a14:useLocalDpi xmlns:a14="http://schemas.microsoft.com/office/drawing/2010/main" val="0"/>
               </a:ext>
             </a:extLst>
           </a:blip>
@@ -19753,14 +19753,14 @@
           <a:effectLst/>
           <a:extLst>
             <a:ext uri="{909E8E84-426E-40DD-AFC4-6F175D3DCCD1}">
-              <a14:hiddenFill xmlns="" xmlns:a14="http://schemas.microsoft.com/office/drawing/2010/main">
+              <a14:hiddenFill xmlns:a14="http://schemas.microsoft.com/office/drawing/2010/main">
                 <a:solidFill>
                   <a:schemeClr val="accent1"/>
                 </a:solidFill>
               </a14:hiddenFill>
             </a:ext>
             <a:ext uri="{91240B29-F687-4F45-9708-019B960494DF}">
-              <a14:hiddenLine xmlns="" xmlns:a14="http://schemas.microsoft.com/office/drawing/2010/main" w="9525">
+              <a14:hiddenLine xmlns:a14="http://schemas.microsoft.com/office/drawing/2010/main" w="9525">
                 <a:solidFill>
                   <a:schemeClr val="tx1"/>
                 </a:solidFill>
@@ -19770,7 +19770,7 @@
               </a14:hiddenLine>
             </a:ext>
             <a:ext uri="{AF507438-7753-43E0-B8FC-AC1667EBCBE1}">
-              <a14:hiddenEffects xmlns="" xmlns:a14="http://schemas.microsoft.com/office/drawing/2010/main">
+              <a14:hiddenEffects xmlns:a14="http://schemas.microsoft.com/office/drawing/2010/main">
                 <a:effectLst>
                   <a:outerShdw dist="35921" dir="2700000" algn="ctr" rotWithShape="0">
                     <a:schemeClr val="bg2"/>
@@ -19793,7 +19793,7 @@
           <a:blip r:embed="rId3" cstate="print">
             <a:extLst>
               <a:ext uri="{28A0092B-C50C-407E-A947-70E740481C1C}">
-                <a14:useLocalDpi xmlns="" xmlns:a14="http://schemas.microsoft.com/office/drawing/2010/main" val="0"/>
+                <a14:useLocalDpi xmlns:a14="http://schemas.microsoft.com/office/drawing/2010/main" val="0"/>
               </a:ext>
             </a:extLst>
           </a:blip>
@@ -19817,14 +19817,14 @@
           <a:effectLst/>
           <a:extLst>
             <a:ext uri="{909E8E84-426E-40DD-AFC4-6F175D3DCCD1}">
-              <a14:hiddenFill xmlns="" xmlns:a14="http://schemas.microsoft.com/office/drawing/2010/main">
+              <a14:hiddenFill xmlns:a14="http://schemas.microsoft.com/office/drawing/2010/main">
                 <a:solidFill>
                   <a:schemeClr val="accent1"/>
                 </a:solidFill>
               </a14:hiddenFill>
             </a:ext>
             <a:ext uri="{91240B29-F687-4F45-9708-019B960494DF}">
-              <a14:hiddenLine xmlns="" xmlns:a14="http://schemas.microsoft.com/office/drawing/2010/main" w="9525">
+              <a14:hiddenLine xmlns:a14="http://schemas.microsoft.com/office/drawing/2010/main" w="9525">
                 <a:solidFill>
                   <a:schemeClr val="tx1"/>
                 </a:solidFill>
@@ -19834,7 +19834,7 @@
               </a14:hiddenLine>
             </a:ext>
             <a:ext uri="{AF507438-7753-43E0-B8FC-AC1667EBCBE1}">
-              <a14:hiddenEffects xmlns="" xmlns:a14="http://schemas.microsoft.com/office/drawing/2010/main">
+              <a14:hiddenEffects xmlns:a14="http://schemas.microsoft.com/office/drawing/2010/main">
                 <a:effectLst>
                   <a:outerShdw dist="35921" dir="2700000" algn="ctr" rotWithShape="0">
                     <a:schemeClr val="bg2"/>
@@ -21267,7 +21267,7 @@
           <a:blip r:embed="rId4" cstate="print">
             <a:extLst>
               <a:ext uri="{28A0092B-C50C-407E-A947-70E740481C1C}">
-                <a14:useLocalDpi xmlns="" xmlns:a14="http://schemas.microsoft.com/office/drawing/2010/main" val="0"/>
+                <a14:useLocalDpi xmlns:a14="http://schemas.microsoft.com/office/drawing/2010/main" val="0"/>
               </a:ext>
             </a:extLst>
           </a:blip>
@@ -21291,14 +21291,14 @@
           <a:effectLst/>
           <a:extLst>
             <a:ext uri="{909E8E84-426E-40DD-AFC4-6F175D3DCCD1}">
-              <a14:hiddenFill xmlns="" xmlns:a14="http://schemas.microsoft.com/office/drawing/2010/main">
+              <a14:hiddenFill xmlns:a14="http://schemas.microsoft.com/office/drawing/2010/main">
                 <a:solidFill>
                   <a:schemeClr val="accent1"/>
                 </a:solidFill>
               </a14:hiddenFill>
             </a:ext>
             <a:ext uri="{91240B29-F687-4F45-9708-019B960494DF}">
-              <a14:hiddenLine xmlns="" xmlns:a14="http://schemas.microsoft.com/office/drawing/2010/main" w="9525">
+              <a14:hiddenLine xmlns:a14="http://schemas.microsoft.com/office/drawing/2010/main" w="9525">
                 <a:solidFill>
                   <a:schemeClr val="tx1"/>
                 </a:solidFill>
@@ -21308,7 +21308,7 @@
               </a14:hiddenLine>
             </a:ext>
             <a:ext uri="{AF507438-7753-43E0-B8FC-AC1667EBCBE1}">
-              <a14:hiddenEffects xmlns="" xmlns:a14="http://schemas.microsoft.com/office/drawing/2010/main">
+              <a14:hiddenEffects xmlns:a14="http://schemas.microsoft.com/office/drawing/2010/main">
                 <a:effectLst>
                   <a:outerShdw dist="35921" dir="2700000" algn="ctr" rotWithShape="0">
                     <a:schemeClr val="bg2"/>
@@ -21331,7 +21331,7 @@
           <a:blip r:embed="rId5" cstate="print">
             <a:extLst>
               <a:ext uri="{28A0092B-C50C-407E-A947-70E740481C1C}">
-                <a14:useLocalDpi xmlns="" xmlns:a14="http://schemas.microsoft.com/office/drawing/2010/main" val="0"/>
+                <a14:useLocalDpi xmlns:a14="http://schemas.microsoft.com/office/drawing/2010/main" val="0"/>
               </a:ext>
             </a:extLst>
           </a:blip>
@@ -21355,14 +21355,14 @@
           <a:effectLst/>
           <a:extLst>
             <a:ext uri="{909E8E84-426E-40DD-AFC4-6F175D3DCCD1}">
-              <a14:hiddenFill xmlns="" xmlns:a14="http://schemas.microsoft.com/office/drawing/2010/main">
+              <a14:hiddenFill xmlns:a14="http://schemas.microsoft.com/office/drawing/2010/main">
                 <a:solidFill>
                   <a:schemeClr val="accent1"/>
                 </a:solidFill>
               </a14:hiddenFill>
             </a:ext>
             <a:ext uri="{91240B29-F687-4F45-9708-019B960494DF}">
-              <a14:hiddenLine xmlns="" xmlns:a14="http://schemas.microsoft.com/office/drawing/2010/main" w="9525">
+              <a14:hiddenLine xmlns:a14="http://schemas.microsoft.com/office/drawing/2010/main" w="9525">
                 <a:solidFill>
                   <a:schemeClr val="tx1"/>
                 </a:solidFill>
@@ -21372,7 +21372,7 @@
               </a14:hiddenLine>
             </a:ext>
             <a:ext uri="{AF507438-7753-43E0-B8FC-AC1667EBCBE1}">
-              <a14:hiddenEffects xmlns="" xmlns:a14="http://schemas.microsoft.com/office/drawing/2010/main">
+              <a14:hiddenEffects xmlns:a14="http://schemas.microsoft.com/office/drawing/2010/main">
                 <a:effectLst>
                   <a:outerShdw dist="35921" dir="2700000" algn="ctr" rotWithShape="0">
                     <a:schemeClr val="bg2"/>
@@ -21395,7 +21395,7 @@
           <a:blip r:embed="rId6">
             <a:extLst>
               <a:ext uri="{28A0092B-C50C-407E-A947-70E740481C1C}">
-                <a14:useLocalDpi xmlns="" xmlns:a14="http://schemas.microsoft.com/office/drawing/2010/main" val="0"/>
+                <a14:useLocalDpi xmlns:a14="http://schemas.microsoft.com/office/drawing/2010/main" val="0"/>
               </a:ext>
             </a:extLst>
           </a:blip>
@@ -21419,14 +21419,14 @@
           <a:effectLst/>
           <a:extLst>
             <a:ext uri="{909E8E84-426E-40DD-AFC4-6F175D3DCCD1}">
-              <a14:hiddenFill xmlns="" xmlns:a14="http://schemas.microsoft.com/office/drawing/2010/main">
+              <a14:hiddenFill xmlns:a14="http://schemas.microsoft.com/office/drawing/2010/main">
                 <a:solidFill>
                   <a:schemeClr val="accent1"/>
                 </a:solidFill>
               </a14:hiddenFill>
             </a:ext>
             <a:ext uri="{91240B29-F687-4F45-9708-019B960494DF}">
-              <a14:hiddenLine xmlns="" xmlns:a14="http://schemas.microsoft.com/office/drawing/2010/main" w="9525">
+              <a14:hiddenLine xmlns:a14="http://schemas.microsoft.com/office/drawing/2010/main" w="9525">
                 <a:solidFill>
                   <a:schemeClr val="tx1"/>
                 </a:solidFill>
@@ -21436,7 +21436,7 @@
               </a14:hiddenLine>
             </a:ext>
             <a:ext uri="{AF507438-7753-43E0-B8FC-AC1667EBCBE1}">
-              <a14:hiddenEffects xmlns="" xmlns:a14="http://schemas.microsoft.com/office/drawing/2010/main">
+              <a14:hiddenEffects xmlns:a14="http://schemas.microsoft.com/office/drawing/2010/main">
                 <a:effectLst>
                   <a:outerShdw dist="35921" dir="2700000" algn="ctr" rotWithShape="0">
                     <a:schemeClr val="bg2"/>
@@ -21450,7 +21450,7 @@
     </p:spTree>
     <p:extLst>
       <p:ext uri="{BB962C8B-B14F-4D97-AF65-F5344CB8AC3E}">
-        <p14:creationId xmlns="" xmlns:p14="http://schemas.microsoft.com/office/powerpoint/2010/main" val="3045161246"/>
+        <p14:creationId xmlns:p14="http://schemas.microsoft.com/office/powerpoint/2010/main" val="3045161246"/>
       </p:ext>
     </p:extLst>
   </p:cSld>
@@ -21489,7 +21489,7 @@
           <a:blip r:embed="rId2" cstate="print">
             <a:extLst>
               <a:ext uri="{28A0092B-C50C-407E-A947-70E740481C1C}">
-                <a14:useLocalDpi xmlns="" xmlns:a14="http://schemas.microsoft.com/office/drawing/2010/main" val="0"/>
+                <a14:useLocalDpi xmlns:a14="http://schemas.microsoft.com/office/drawing/2010/main" val="0"/>
               </a:ext>
             </a:extLst>
           </a:blip>
@@ -21513,14 +21513,14 @@
           <a:effectLst/>
           <a:extLst>
             <a:ext uri="{909E8E84-426E-40DD-AFC4-6F175D3DCCD1}">
-              <a14:hiddenFill xmlns="" xmlns:a14="http://schemas.microsoft.com/office/drawing/2010/main">
+              <a14:hiddenFill xmlns:a14="http://schemas.microsoft.com/office/drawing/2010/main">
                 <a:solidFill>
                   <a:schemeClr val="accent1"/>
                 </a:solidFill>
               </a14:hiddenFill>
             </a:ext>
             <a:ext uri="{91240B29-F687-4F45-9708-019B960494DF}">
-              <a14:hiddenLine xmlns="" xmlns:a14="http://schemas.microsoft.com/office/drawing/2010/main" w="9525">
+              <a14:hiddenLine xmlns:a14="http://schemas.microsoft.com/office/drawing/2010/main" w="9525">
                 <a:solidFill>
                   <a:schemeClr val="tx1"/>
                 </a:solidFill>
@@ -21530,7 +21530,7 @@
               </a14:hiddenLine>
             </a:ext>
             <a:ext uri="{AF507438-7753-43E0-B8FC-AC1667EBCBE1}">
-              <a14:hiddenEffects xmlns="" xmlns:a14="http://schemas.microsoft.com/office/drawing/2010/main">
+              <a14:hiddenEffects xmlns:a14="http://schemas.microsoft.com/office/drawing/2010/main">
                 <a:effectLst>
                   <a:outerShdw dist="35921" dir="2700000" algn="ctr" rotWithShape="0">
                     <a:schemeClr val="bg2"/>
@@ -22154,7 +22154,7 @@
     </p:spTree>
     <p:extLst>
       <p:ext uri="{BB962C8B-B14F-4D97-AF65-F5344CB8AC3E}">
-        <p14:creationId xmlns="" xmlns:p14="http://schemas.microsoft.com/office/powerpoint/2010/main" val="2938322222"/>
+        <p14:creationId xmlns:p14="http://schemas.microsoft.com/office/powerpoint/2010/main" val="2938322222"/>
       </p:ext>
     </p:extLst>
   </p:cSld>
@@ -23293,7 +23293,7 @@
     </p:spTree>
     <p:extLst>
       <p:ext uri="{BB962C8B-B14F-4D97-AF65-F5344CB8AC3E}">
-        <p14:creationId xmlns="" xmlns:p14="http://schemas.microsoft.com/office/powerpoint/2010/main" val="1027029552"/>
+        <p14:creationId xmlns:p14="http://schemas.microsoft.com/office/powerpoint/2010/main" val="1027029552"/>
       </p:ext>
     </p:extLst>
   </p:cSld>
@@ -24314,7 +24314,7 @@
     </p:spTree>
     <p:extLst>
       <p:ext uri="{BB962C8B-B14F-4D97-AF65-F5344CB8AC3E}">
-        <p14:creationId xmlns="" xmlns:p14="http://schemas.microsoft.com/office/powerpoint/2010/main" val="3190428975"/>
+        <p14:creationId xmlns:p14="http://schemas.microsoft.com/office/powerpoint/2010/main" val="3190428975"/>
       </p:ext>
     </p:extLst>
   </p:cSld>
@@ -25193,7 +25193,7 @@
     </p:spTree>
     <p:extLst>
       <p:ext uri="{BB962C8B-B14F-4D97-AF65-F5344CB8AC3E}">
-        <p14:creationId xmlns="" xmlns:p14="http://schemas.microsoft.com/office/powerpoint/2010/main" val="486717809"/>
+        <p14:creationId xmlns:p14="http://schemas.microsoft.com/office/powerpoint/2010/main" val="486717809"/>
       </p:ext>
     </p:extLst>
   </p:cSld>

</xml_diff>